<commit_message>
after adding 2nd review ppt
</commit_message>
<xml_diff>
--- a/ppts/Fake Currency Detection Using Image Processing.pptx
+++ b/ppts/Fake Currency Detection Using Image Processing.pptx
@@ -254,8 +254,11 @@
     </a:lvl9pPr>
   </p:defaultTextStyle>
   <p:extLst>
+    <p:ext uri="{EFAFB233-063F-42B5-8137-9DF3F51BA10A}">
+      <p15:sldGuideLst xmlns:p15="http://schemas.microsoft.com/office/powerpoint/2012/main"/>
+    </p:ext>
     <p:ext uri="http://customooxmlschemas.google.com/">
-      <go:slidesCustomData xmlns:go="http://customooxmlschemas.google.com/" xmlns:ahyp="http://schemas.microsoft.com/office/drawing/2018/hyperlinkcolor" xmlns:p15="http://schemas.microsoft.com/office/powerpoint/2012/main" xmlns:p14="http://schemas.microsoft.com/office/powerpoint/2010/main" xmlns:com="http://schemas.openxmlformats.org/drawingml/2006/compatibility" xmlns:pvml="urn:schemas-microsoft-com:office:powerpoint" xmlns:v="urn:schemas-microsoft-com:vml" xmlns:o="urn:schemas-microsoft-com:office:office" xmlns:dgm="http://schemas.openxmlformats.org/drawingml/2006/diagram" xmlns:c="http://schemas.openxmlformats.org/drawingml/2006/chart" xmlns:mv="urn:schemas-microsoft-com:mac:vml" xmlns:mc="http://schemas.openxmlformats.org/markup-compatibility/2006" xmlns="" r:id="rId19" roundtripDataSignature="AMtx7mieMCNjtQBrrot0qe6iwBlGvLT4Jg=="/>
+      <go:slidesCustomData xmlns="" xmlns:mc="http://schemas.openxmlformats.org/markup-compatibility/2006" xmlns:mv="urn:schemas-microsoft-com:mac:vml" xmlns:c="http://schemas.openxmlformats.org/drawingml/2006/chart" xmlns:dgm="http://schemas.openxmlformats.org/drawingml/2006/diagram" xmlns:o="urn:schemas-microsoft-com:office:office" xmlns:v="urn:schemas-microsoft-com:vml" xmlns:pvml="urn:schemas-microsoft-com:office:powerpoint" xmlns:com="http://schemas.openxmlformats.org/drawingml/2006/compatibility" xmlns:p14="http://schemas.microsoft.com/office/powerpoint/2010/main" xmlns:p15="http://schemas.microsoft.com/office/powerpoint/2012/main" xmlns:ahyp="http://schemas.microsoft.com/office/drawing/2018/hyperlinkcolor" xmlns:go="http://customooxmlschemas.google.com/" r:id="rId19" roundtripDataSignature="AMtx7mieMCNjtQBrrot0qe6iwBlGvLT4Jg=="/>
     </p:ext>
   </p:extLst>
 </p:presentation>
@@ -2317,8 +2320,8 @@
         </p:nvSpPr>
         <p:spPr>
           <a:xfrm>
-            <a:off x="1143225" y="685800"/>
-            <a:ext cx="4572225" cy="3429000"/>
+            <a:off x="381000" y="685800"/>
+            <a:ext cx="6096000" cy="3429000"/>
           </a:xfrm>
           <a:custGeom>
             <a:avLst/>
@@ -16374,7 +16377,7 @@
               <a:buNone/>
             </a:pPr>
             <a:r>
-              <a:rPr lang="en-US" sz="2400" b="0" i="0" u="none" strike="noStrike" cap="none">
+              <a:rPr lang="en-US" sz="2400" b="0" i="0" u="none" strike="noStrike" cap="none" dirty="0">
                 <a:solidFill>
                   <a:srgbClr val="000000"/>
                 </a:solidFill>
@@ -16383,9 +16386,105 @@
                 <a:cs typeface="Times"/>
                 <a:sym typeface="Times"/>
               </a:rPr>
-              <a:t>Aman Bhatia, Vansh Kedia, Anshul Shroff, Mayand Kumar, Bickey Kumar Shah, Aryan ,</a:t>
+              <a:t>Aman Bhatia, </a:t>
             </a:r>
-            <a:endParaRPr/>
+            <a:r>
+              <a:rPr lang="en-US" sz="2400" b="0" i="0" u="none" strike="noStrike" cap="none" dirty="0" err="1">
+                <a:solidFill>
+                  <a:srgbClr val="000000"/>
+                </a:solidFill>
+                <a:latin typeface="Times"/>
+                <a:ea typeface="Times"/>
+                <a:cs typeface="Times"/>
+                <a:sym typeface="Times"/>
+              </a:rPr>
+              <a:t>Vansh</a:t>
+            </a:r>
+            <a:r>
+              <a:rPr lang="en-US" sz="2400" b="0" i="0" u="none" strike="noStrike" cap="none" dirty="0">
+                <a:solidFill>
+                  <a:srgbClr val="000000"/>
+                </a:solidFill>
+                <a:latin typeface="Times"/>
+                <a:ea typeface="Times"/>
+                <a:cs typeface="Times"/>
+                <a:sym typeface="Times"/>
+              </a:rPr>
+              <a:t> </a:t>
+            </a:r>
+            <a:r>
+              <a:rPr lang="en-US" sz="2400" b="0" i="0" u="none" strike="noStrike" cap="none" dirty="0" err="1">
+                <a:solidFill>
+                  <a:srgbClr val="000000"/>
+                </a:solidFill>
+                <a:latin typeface="Times"/>
+                <a:ea typeface="Times"/>
+                <a:cs typeface="Times"/>
+                <a:sym typeface="Times"/>
+              </a:rPr>
+              <a:t>Kedia</a:t>
+            </a:r>
+            <a:r>
+              <a:rPr lang="en-US" sz="2400" b="0" i="0" u="none" strike="noStrike" cap="none" dirty="0">
+                <a:solidFill>
+                  <a:srgbClr val="000000"/>
+                </a:solidFill>
+                <a:latin typeface="Times"/>
+                <a:ea typeface="Times"/>
+                <a:cs typeface="Times"/>
+                <a:sym typeface="Times"/>
+              </a:rPr>
+              <a:t>, Anshul Shroff, </a:t>
+            </a:r>
+            <a:r>
+              <a:rPr lang="en-US" sz="2400" b="0" i="0" u="none" strike="noStrike" cap="none" dirty="0" err="1">
+                <a:solidFill>
+                  <a:srgbClr val="000000"/>
+                </a:solidFill>
+                <a:latin typeface="Times"/>
+                <a:ea typeface="Times"/>
+                <a:cs typeface="Times"/>
+                <a:sym typeface="Times"/>
+              </a:rPr>
+              <a:t>Mayand</a:t>
+            </a:r>
+            <a:r>
+              <a:rPr lang="en-US" sz="2400" b="0" i="0" u="none" strike="noStrike" cap="none" dirty="0">
+                <a:solidFill>
+                  <a:srgbClr val="000000"/>
+                </a:solidFill>
+                <a:latin typeface="Times"/>
+                <a:ea typeface="Times"/>
+                <a:cs typeface="Times"/>
+                <a:sym typeface="Times"/>
+              </a:rPr>
+              <a:t> Kumar, </a:t>
+            </a:r>
+            <a:r>
+              <a:rPr lang="en-US" sz="2400" b="0" i="0" u="none" strike="noStrike" cap="none" dirty="0" err="1">
+                <a:solidFill>
+                  <a:srgbClr val="000000"/>
+                </a:solidFill>
+                <a:latin typeface="Times"/>
+                <a:ea typeface="Times"/>
+                <a:cs typeface="Times"/>
+                <a:sym typeface="Times"/>
+              </a:rPr>
+              <a:t>Bickey</a:t>
+            </a:r>
+            <a:r>
+              <a:rPr lang="en-US" sz="2400" b="0" i="0" u="none" strike="noStrike" cap="none" dirty="0">
+                <a:solidFill>
+                  <a:srgbClr val="000000"/>
+                </a:solidFill>
+                <a:latin typeface="Times"/>
+                <a:ea typeface="Times"/>
+                <a:cs typeface="Times"/>
+                <a:sym typeface="Times"/>
+              </a:rPr>
+              <a:t> Kumar Shah, Aryan ,</a:t>
+            </a:r>
+            <a:endParaRPr dirty="0"/>
           </a:p>
           <a:p>
             <a:pPr marL="0" marR="0" lvl="0" indent="0" algn="l" rtl="0">
@@ -16401,7 +16500,7 @@
               <a:buNone/>
             </a:pPr>
             <a:r>
-              <a:rPr lang="en-US" sz="2400" b="0" i="0" u="none" strike="noStrike" cap="none">
+              <a:rPr lang="en-US" sz="2400" b="0" i="0" u="none" strike="noStrike" cap="none" dirty="0">
                 <a:solidFill>
                   <a:srgbClr val="000000"/>
                 </a:solidFill>
@@ -16413,7 +16512,7 @@
               <a:t>“</a:t>
             </a:r>
             <a:r>
-              <a:rPr lang="en-US" sz="2400" b="0" i="0" u="none" strike="noStrike" cap="none">
+              <a:rPr lang="en-US" sz="2400" b="0" i="0" u="none" strike="noStrike" cap="none" dirty="0">
                 <a:solidFill>
                   <a:srgbClr val="000000"/>
                 </a:solidFill>
@@ -16424,7 +16523,7 @@
               </a:rPr>
               <a:t>Fake Currency Detection with Machine Learning</a:t>
             </a:r>
-            <a:endParaRPr/>
+            <a:endParaRPr dirty="0"/>
           </a:p>
           <a:p>
             <a:pPr marL="0" marR="0" lvl="0" indent="0" algn="l" rtl="0">
@@ -16440,7 +16539,7 @@
               <a:buNone/>
             </a:pPr>
             <a:r>
-              <a:rPr lang="en-US" sz="2400" b="0" i="0" u="none" strike="noStrike" cap="none">
+              <a:rPr lang="en-US" sz="2400" b="0" i="0" u="none" strike="noStrike" cap="none" dirty="0">
                 <a:solidFill>
                   <a:srgbClr val="000000"/>
                 </a:solidFill>
@@ -16452,7 +16551,7 @@
               <a:t>Algorithm and Image Processing</a:t>
             </a:r>
             <a:r>
-              <a:rPr lang="en-US" sz="2400" b="1" i="0" u="none" strike="noStrike" cap="none">
+              <a:rPr lang="en-US" sz="2400" b="1" i="0" u="none" strike="noStrike" cap="none" dirty="0">
                 <a:solidFill>
                   <a:srgbClr val="000000"/>
                 </a:solidFill>
@@ -16464,7 +16563,7 @@
               <a:t>”, </a:t>
             </a:r>
             <a:r>
-              <a:rPr lang="en-US" sz="2400" b="0" i="0" u="none" strike="noStrike" cap="none">
+              <a:rPr lang="en-US" sz="2400" b="0" i="0" u="none" strike="noStrike" cap="none" dirty="0">
                 <a:solidFill>
                   <a:srgbClr val="000000"/>
                 </a:solidFill>
@@ -16475,7 +16574,7 @@
               </a:rPr>
               <a:t>DOI:10.1109/ICICCS51141.2021.9432274</a:t>
             </a:r>
-            <a:endParaRPr sz="2400" b="0" i="0" u="none" strike="noStrike" cap="none">
+            <a:endParaRPr sz="2400" b="0" i="0" u="none" strike="noStrike" cap="none" dirty="0">
               <a:solidFill>
                 <a:srgbClr val="000000"/>
               </a:solidFill>
@@ -17943,11 +18042,17 @@
         <p:nvGraphicFramePr>
           <p:cNvPr id="140" name="Google Shape;140;p23"/>
           <p:cNvGraphicFramePr/>
-          <p:nvPr/>
+          <p:nvPr>
+            <p:extLst>
+              <p:ext uri="{D42A27DB-BD31-4B8C-83A1-F6EECF244321}">
+                <p14:modId xmlns:p14="http://schemas.microsoft.com/office/powerpoint/2010/main" val="265359950"/>
+              </p:ext>
+            </p:extLst>
+          </p:nvPr>
         </p:nvGraphicFramePr>
         <p:xfrm>
           <a:off x="1020721" y="1731275"/>
-          <a:ext cx="3000000" cy="3000000"/>
+          <a:ext cx="10237400" cy="4306195"/>
         </p:xfrm>
         <a:graphic>
           <a:graphicData uri="http://schemas.openxmlformats.org/drawingml/2006/table">
@@ -18164,10 +18269,10 @@
                         <a:buNone/>
                       </a:pPr>
                       <a:r>
-                        <a:rPr lang="en-US" sz="1800" u="none" strike="noStrike" cap="none"/>
-                        <a:t>Sprint 1</a:t>
+                        <a:rPr lang="en-US" sz="1800" u="none" strike="noStrike" cap="none" dirty="0"/>
+                        <a:t>Module 1</a:t>
                       </a:r>
-                      <a:endParaRPr sz="1800" u="none" strike="noStrike" cap="none"/>
+                      <a:endParaRPr sz="1800" u="none" strike="noStrike" cap="none" dirty="0"/>
                     </a:p>
                   </a:txBody>
                   <a:tcPr marL="91450" marR="91450" marT="45725" marB="45725" anchor="ctr">
@@ -18291,10 +18396,10 @@
                         <a:buNone/>
                       </a:pPr>
                       <a:r>
-                        <a:rPr lang="en-US" sz="1800" u="none" strike="noStrike" cap="none"/>
-                        <a:t>Sprint 2</a:t>
+                        <a:rPr lang="en-US" sz="1800" u="none" strike="noStrike" cap="none" dirty="0"/>
+                        <a:t>Module 2</a:t>
                       </a:r>
-                      <a:endParaRPr sz="1800" u="none" strike="noStrike" cap="none"/>
+                      <a:endParaRPr sz="1800" u="none" strike="noStrike" cap="none" dirty="0"/>
                     </a:p>
                   </a:txBody>
                   <a:tcPr marL="91450" marR="91450" marT="45725" marB="45725" anchor="ctr">
@@ -18418,10 +18523,10 @@
                         <a:buNone/>
                       </a:pPr>
                       <a:r>
-                        <a:rPr lang="en-US" sz="1800" u="none" strike="noStrike" cap="none"/>
-                        <a:t>Sprint 3</a:t>
+                        <a:rPr lang="en-US" sz="1800" u="none" strike="noStrike" cap="none" dirty="0"/>
+                        <a:t>Module 3</a:t>
                       </a:r>
-                      <a:endParaRPr sz="1800" u="none" strike="noStrike" cap="none"/>
+                      <a:endParaRPr sz="1800" u="none" strike="noStrike" cap="none" dirty="0"/>
                     </a:p>
                   </a:txBody>
                   <a:tcPr marL="91450" marR="91450" marT="45725" marB="45725" anchor="ctr">
@@ -18545,10 +18650,10 @@
                         <a:buNone/>
                       </a:pPr>
                       <a:r>
-                        <a:rPr lang="en-US" sz="1800" u="none" strike="noStrike" cap="none"/>
-                        <a:t>Sprint 4</a:t>
+                        <a:rPr lang="en-US" sz="1800" u="none" strike="noStrike" cap="none" dirty="0"/>
+                        <a:t>Module 4</a:t>
                       </a:r>
-                      <a:endParaRPr sz="1800" u="none" strike="noStrike" cap="none"/>
+                      <a:endParaRPr sz="1800" u="none" strike="noStrike" cap="none" dirty="0"/>
                     </a:p>
                   </a:txBody>
                   <a:tcPr marL="91450" marR="91450" marT="45725" marB="45725" anchor="ctr">
@@ -18672,10 +18777,10 @@
                         <a:buNone/>
                       </a:pPr>
                       <a:r>
-                        <a:rPr lang="en-US" sz="1800" u="none" strike="noStrike" cap="none"/>
-                        <a:t>Sprint 5</a:t>
+                        <a:rPr lang="en-US" sz="1800" u="none" strike="noStrike" cap="none" dirty="0"/>
+                        <a:t>Module 5</a:t>
                       </a:r>
-                      <a:endParaRPr sz="1800" u="none" strike="noStrike" cap="none"/>
+                      <a:endParaRPr sz="1800" u="none" strike="noStrike" cap="none" dirty="0"/>
                     </a:p>
                   </a:txBody>
                   <a:tcPr marL="91450" marR="91450" marT="45725" marB="45725" anchor="ctr">
@@ -18799,10 +18904,10 @@
                         <a:buNone/>
                       </a:pPr>
                       <a:r>
-                        <a:rPr lang="en-US" sz="1800" u="none" strike="noStrike" cap="none"/>
-                        <a:t>Sprint 6</a:t>
+                        <a:rPr lang="en-US" sz="1800" u="none" strike="noStrike" cap="none" dirty="0"/>
+                        <a:t>Module 6</a:t>
                       </a:r>
-                      <a:endParaRPr sz="1800" u="none" strike="noStrike" cap="none"/>
+                      <a:endParaRPr sz="1800" u="none" strike="noStrike" cap="none" dirty="0"/>
                     </a:p>
                   </a:txBody>
                   <a:tcPr marL="91450" marR="91450" marT="45725" marB="45725" anchor="ctr">
@@ -18889,10 +18994,10 @@
                         <a:buNone/>
                       </a:pPr>
                       <a:r>
-                        <a:rPr lang="en-US" sz="1800" u="none" strike="noStrike" cap="none"/>
+                        <a:rPr lang="en-US" sz="1800" u="none" strike="noStrike" cap="none" dirty="0"/>
                         <a:t>31/03/2023</a:t>
                       </a:r>
-                      <a:endParaRPr sz="1800" u="none" strike="noStrike" cap="none"/>
+                      <a:endParaRPr sz="1800" u="none" strike="noStrike" cap="none" dirty="0"/>
                     </a:p>
                   </a:txBody>
                   <a:tcPr marL="91450" marR="91450" marT="45725" marB="45725" anchor="ctr">

</xml_diff>